<commit_message>
updated presentation and codebase again
</commit_message>
<xml_diff>
--- a/Lufthansa Solutions Squad/Wolfi_Präsentation.pptx
+++ b/Lufthansa Solutions Squad/Wolfi_Präsentation.pptx
@@ -122,10 +122,10 @@
 <p1510:revInfo xmlns:a="http://schemas.openxmlformats.org/drawingml/2006/main" xmlns:r="http://schemas.openxmlformats.org/officeDocument/2006/relationships" xmlns:p1510="http://schemas.microsoft.com/office/powerpoint/2015/10/main">
   <p1510:revLst>
     <p1510:client id="{102C955B-E6BF-42EE-B533-857F7908BAD7}" v="8" dt="2025-03-14T08:41:24.370"/>
-    <p1510:client id="{79BF3A4E-41B3-4500-9D1A-5C39EA0DF539}" v="99" dt="2025-03-14T09:15:22.583"/>
+    <p1510:client id="{79BF3A4E-41B3-4500-9D1A-5C39EA0DF539}" v="715" dt="2025-03-14T09:38:49.815"/>
     <p1510:client id="{A89B296C-E9F3-0377-9AD2-8FC195FAEAE5}" v="2" dt="2025-03-14T09:15:08.826"/>
     <p1510:client id="{D5ECBB7C-8B3D-7240-45EC-8EF76D504CFD}" v="220" dt="2025-03-14T09:12:23.400"/>
-    <p1510:client id="{DB2ECFE5-EF57-4849-ACE3-92B6D295F1C6}" v="495" dt="2025-03-14T09:15:48.311"/>
+    <p1510:client id="{DB2ECFE5-EF57-4849-ACE3-92B6D295F1C6}" v="566" dt="2025-03-14T09:21:25.937"/>
   </p1510:revLst>
 </p1510:revInfo>
 </file>
@@ -356,22 +356,125 @@
   <pc:docChgLst>
     <pc:chgData name="MARUSHCHAK, MYKOLA" userId="S::mykola.marushchak@lhind.dlh.de::5dfe517b-ae41-4ed6-874e-b41095c1b498" providerId="AD" clId="Web-{79BF3A4E-41B3-4500-9D1A-5C39EA0DF539}"/>
     <pc:docChg chg="modSld">
-      <pc:chgData name="MARUSHCHAK, MYKOLA" userId="S::mykola.marushchak@lhind.dlh.de::5dfe517b-ae41-4ed6-874e-b41095c1b498" providerId="AD" clId="Web-{79BF3A4E-41B3-4500-9D1A-5C39EA0DF539}" dt="2025-03-14T09:15:19.755" v="97" actId="20577"/>
+      <pc:chgData name="MARUSHCHAK, MYKOLA" userId="S::mykola.marushchak@lhind.dlh.de::5dfe517b-ae41-4ed6-874e-b41095c1b498" providerId="AD" clId="Web-{79BF3A4E-41B3-4500-9D1A-5C39EA0DF539}" dt="2025-03-14T09:38:48.268" v="706" actId="20577"/>
       <pc:docMkLst>
         <pc:docMk/>
       </pc:docMkLst>
       <pc:sldChg chg="modSp">
-        <pc:chgData name="MARUSHCHAK, MYKOLA" userId="S::mykola.marushchak@lhind.dlh.de::5dfe517b-ae41-4ed6-874e-b41095c1b498" providerId="AD" clId="Web-{79BF3A4E-41B3-4500-9D1A-5C39EA0DF539}" dt="2025-03-14T09:15:19.755" v="97" actId="20577"/>
+        <pc:chgData name="MARUSHCHAK, MYKOLA" userId="S::mykola.marushchak@lhind.dlh.de::5dfe517b-ae41-4ed6-874e-b41095c1b498" providerId="AD" clId="Web-{79BF3A4E-41B3-4500-9D1A-5C39EA0DF539}" dt="2025-03-14T09:37:04.874" v="675" actId="1076"/>
         <pc:sldMkLst>
           <pc:docMk/>
           <pc:sldMk cId="2338513541" sldId="603"/>
         </pc:sldMkLst>
         <pc:spChg chg="mod">
-          <ac:chgData name="MARUSHCHAK, MYKOLA" userId="S::mykola.marushchak@lhind.dlh.de::5dfe517b-ae41-4ed6-874e-b41095c1b498" providerId="AD" clId="Web-{79BF3A4E-41B3-4500-9D1A-5C39EA0DF539}" dt="2025-03-14T09:15:19.755" v="97" actId="20577"/>
+          <ac:chgData name="MARUSHCHAK, MYKOLA" userId="S::mykola.marushchak@lhind.dlh.de::5dfe517b-ae41-4ed6-874e-b41095c1b498" providerId="AD" clId="Web-{79BF3A4E-41B3-4500-9D1A-5C39EA0DF539}" dt="2025-03-14T09:35:01.886" v="663" actId="1076"/>
+          <ac:spMkLst>
+            <pc:docMk/>
+            <pc:sldMk cId="2338513541" sldId="603"/>
+            <ac:spMk id="5" creationId="{60EF89EA-2F92-C3EB-9B1C-5F1BB05696E0}"/>
+          </ac:spMkLst>
+        </pc:spChg>
+        <pc:spChg chg="mod">
+          <ac:chgData name="MARUSHCHAK, MYKOLA" userId="S::mykola.marushchak@lhind.dlh.de::5dfe517b-ae41-4ed6-874e-b41095c1b498" providerId="AD" clId="Web-{79BF3A4E-41B3-4500-9D1A-5C39EA0DF539}" dt="2025-03-14T09:35:17.714" v="667" actId="1076"/>
+          <ac:spMkLst>
+            <pc:docMk/>
+            <pc:sldMk cId="2338513541" sldId="603"/>
+            <ac:spMk id="25" creationId="{4426C380-74BB-56BE-D6B7-45C3D7926969}"/>
+          </ac:spMkLst>
+        </pc:spChg>
+        <pc:spChg chg="mod">
+          <ac:chgData name="MARUSHCHAK, MYKOLA" userId="S::mykola.marushchak@lhind.dlh.de::5dfe517b-ae41-4ed6-874e-b41095c1b498" providerId="AD" clId="Web-{79BF3A4E-41B3-4500-9D1A-5C39EA0DF539}" dt="2025-03-14T09:34:31.651" v="659" actId="1076"/>
+          <ac:spMkLst>
+            <pc:docMk/>
+            <pc:sldMk cId="2338513541" sldId="603"/>
+            <ac:spMk id="50" creationId="{7B7A878B-3B76-B576-C5F4-5EFB0D4F8E22}"/>
+          </ac:spMkLst>
+        </pc:spChg>
+        <pc:spChg chg="mod">
+          <ac:chgData name="MARUSHCHAK, MYKOLA" userId="S::mykola.marushchak@lhind.dlh.de::5dfe517b-ae41-4ed6-874e-b41095c1b498" providerId="AD" clId="Web-{79BF3A4E-41B3-4500-9D1A-5C39EA0DF539}" dt="2025-03-14T09:37:00.249" v="674" actId="1076"/>
           <ac:spMkLst>
             <pc:docMk/>
             <pc:sldMk cId="2338513541" sldId="603"/>
             <ac:spMk id="53" creationId="{7B9765A0-5F32-0AB3-1023-7E693D8F73C8}"/>
+          </ac:spMkLst>
+        </pc:spChg>
+        <pc:spChg chg="mod">
+          <ac:chgData name="MARUSHCHAK, MYKOLA" userId="S::mykola.marushchak@lhind.dlh.de::5dfe517b-ae41-4ed6-874e-b41095c1b498" providerId="AD" clId="Web-{79BF3A4E-41B3-4500-9D1A-5C39EA0DF539}" dt="2025-03-14T09:37:04.874" v="675" actId="1076"/>
+          <ac:spMkLst>
+            <pc:docMk/>
+            <pc:sldMk cId="2338513541" sldId="603"/>
+            <ac:spMk id="54" creationId="{D51FD201-7A9D-FE8E-DA8C-9E2EA19F6804}"/>
+          </ac:spMkLst>
+        </pc:spChg>
+        <pc:spChg chg="mod">
+          <ac:chgData name="MARUSHCHAK, MYKOLA" userId="S::mykola.marushchak@lhind.dlh.de::5dfe517b-ae41-4ed6-874e-b41095c1b498" providerId="AD" clId="Web-{79BF3A4E-41B3-4500-9D1A-5C39EA0DF539}" dt="2025-03-14T09:35:30.809" v="668" actId="20577"/>
+          <ac:spMkLst>
+            <pc:docMk/>
+            <pc:sldMk cId="2338513541" sldId="603"/>
+            <ac:spMk id="55" creationId="{C17709ED-4FA6-A454-97A7-AC3BF5B3C1B0}"/>
+          </ac:spMkLst>
+        </pc:spChg>
+        <pc:grpChg chg="mod">
+          <ac:chgData name="MARUSHCHAK, MYKOLA" userId="S::mykola.marushchak@lhind.dlh.de::5dfe517b-ae41-4ed6-874e-b41095c1b498" providerId="AD" clId="Web-{79BF3A4E-41B3-4500-9D1A-5C39EA0DF539}" dt="2025-03-14T09:34:41.260" v="660" actId="1076"/>
+          <ac:grpSpMkLst>
+            <pc:docMk/>
+            <pc:sldMk cId="2338513541" sldId="603"/>
+            <ac:grpSpMk id="76" creationId="{AD5276AF-23B5-991E-DFFF-22298DE0D599}"/>
+          </ac:grpSpMkLst>
+        </pc:grpChg>
+        <pc:grpChg chg="mod">
+          <ac:chgData name="MARUSHCHAK, MYKOLA" userId="S::mykola.marushchak@lhind.dlh.de::5dfe517b-ae41-4ed6-874e-b41095c1b498" providerId="AD" clId="Web-{79BF3A4E-41B3-4500-9D1A-5C39EA0DF539}" dt="2025-03-14T09:34:20.260" v="656" actId="1076"/>
+          <ac:grpSpMkLst>
+            <pc:docMk/>
+            <pc:sldMk cId="2338513541" sldId="603"/>
+            <ac:grpSpMk id="77" creationId="{BE24B1C9-8EE5-8417-24FD-B84AF0BC9B18}"/>
+          </ac:grpSpMkLst>
+        </pc:grpChg>
+        <pc:grpChg chg="mod">
+          <ac:chgData name="MARUSHCHAK, MYKOLA" userId="S::mykola.marushchak@lhind.dlh.de::5dfe517b-ae41-4ed6-874e-b41095c1b498" providerId="AD" clId="Web-{79BF3A4E-41B3-4500-9D1A-5C39EA0DF539}" dt="2025-03-14T09:34:25.572" v="657" actId="1076"/>
+          <ac:grpSpMkLst>
+            <pc:docMk/>
+            <pc:sldMk cId="2338513541" sldId="603"/>
+            <ac:grpSpMk id="78" creationId="{C9CE263D-16D4-2A2F-8A25-CD120C32F245}"/>
+          </ac:grpSpMkLst>
+        </pc:grpChg>
+        <pc:grpChg chg="mod">
+          <ac:chgData name="MARUSHCHAK, MYKOLA" userId="S::mykola.marushchak@lhind.dlh.de::5dfe517b-ae41-4ed6-874e-b41095c1b498" providerId="AD" clId="Web-{79BF3A4E-41B3-4500-9D1A-5C39EA0DF539}" dt="2025-03-14T09:30:00.611" v="647" actId="1076"/>
+          <ac:grpSpMkLst>
+            <pc:docMk/>
+            <pc:sldMk cId="2338513541" sldId="603"/>
+            <ac:grpSpMk id="80" creationId="{66295D35-311B-5B36-222C-AF4A815D003E}"/>
+          </ac:grpSpMkLst>
+        </pc:grpChg>
+        <pc:picChg chg="mod">
+          <ac:chgData name="MARUSHCHAK, MYKOLA" userId="S::mykola.marushchak@lhind.dlh.de::5dfe517b-ae41-4ed6-874e-b41095c1b498" providerId="AD" clId="Web-{79BF3A4E-41B3-4500-9D1A-5C39EA0DF539}" dt="2025-03-14T09:34:10.400" v="654" actId="1076"/>
+          <ac:picMkLst>
+            <pc:docMk/>
+            <pc:sldMk cId="2338513541" sldId="603"/>
+            <ac:picMk id="27" creationId="{CE00944A-C81A-8683-2A07-C66083239790}"/>
+          </ac:picMkLst>
+        </pc:picChg>
+      </pc:sldChg>
+      <pc:sldChg chg="addSp delSp modSp">
+        <pc:chgData name="MARUSHCHAK, MYKOLA" userId="S::mykola.marushchak@lhind.dlh.de::5dfe517b-ae41-4ed6-874e-b41095c1b498" providerId="AD" clId="Web-{79BF3A4E-41B3-4500-9D1A-5C39EA0DF539}" dt="2025-03-14T09:38:48.268" v="706" actId="20577"/>
+        <pc:sldMkLst>
+          <pc:docMk/>
+          <pc:sldMk cId="2892836268" sldId="2147469154"/>
+        </pc:sldMkLst>
+        <pc:spChg chg="add del mod">
+          <ac:chgData name="MARUSHCHAK, MYKOLA" userId="S::mykola.marushchak@lhind.dlh.de::5dfe517b-ae41-4ed6-874e-b41095c1b498" providerId="AD" clId="Web-{79BF3A4E-41B3-4500-9D1A-5C39EA0DF539}" dt="2025-03-14T09:38:48.268" v="706" actId="20577"/>
+          <ac:spMkLst>
+            <pc:docMk/>
+            <pc:sldMk cId="2892836268" sldId="2147469154"/>
+            <ac:spMk id="4" creationId="{4F1F4FBE-F0DA-2AD2-E022-5DA0841CB1F6}"/>
+          </ac:spMkLst>
+        </pc:spChg>
+        <pc:spChg chg="add del mod">
+          <ac:chgData name="MARUSHCHAK, MYKOLA" userId="S::mykola.marushchak@lhind.dlh.de::5dfe517b-ae41-4ed6-874e-b41095c1b498" providerId="AD" clId="Web-{79BF3A4E-41B3-4500-9D1A-5C39EA0DF539}" dt="2025-03-14T09:38:09.126" v="682"/>
+          <ac:spMkLst>
+            <pc:docMk/>
+            <pc:sldMk cId="2892836268" sldId="2147469154"/>
+            <ac:spMk id="6" creationId="{9A78E4B9-E576-ABDC-0332-7D5B8D3FF86D}"/>
           </ac:spMkLst>
         </pc:spChg>
       </pc:sldChg>
@@ -380,12 +483,12 @@
   <pc:docChgLst>
     <pc:chgData name="EFINGER, MATHIAS" userId="79c67f0a-8032-477f-8942-8b9587cdf009" providerId="ADAL" clId="{DB2ECFE5-EF57-4849-ACE3-92B6D295F1C6}"/>
     <pc:docChg chg="undo custSel modSld">
-      <pc:chgData name="EFINGER, MATHIAS" userId="79c67f0a-8032-477f-8942-8b9587cdf009" providerId="ADAL" clId="{DB2ECFE5-EF57-4849-ACE3-92B6D295F1C6}" dt="2025-03-14T09:15:48.311" v="648" actId="14100"/>
+      <pc:chgData name="EFINGER, MATHIAS" userId="79c67f0a-8032-477f-8942-8b9587cdf009" providerId="ADAL" clId="{DB2ECFE5-EF57-4849-ACE3-92B6D295F1C6}" dt="2025-03-14T09:21:25.937" v="719" actId="1076"/>
       <pc:docMkLst>
         <pc:docMk/>
       </pc:docMkLst>
       <pc:sldChg chg="addSp delSp modSp mod">
-        <pc:chgData name="EFINGER, MATHIAS" userId="79c67f0a-8032-477f-8942-8b9587cdf009" providerId="ADAL" clId="{DB2ECFE5-EF57-4849-ACE3-92B6D295F1C6}" dt="2025-03-14T09:15:48.311" v="648" actId="14100"/>
+        <pc:chgData name="EFINGER, MATHIAS" userId="79c67f0a-8032-477f-8942-8b9587cdf009" providerId="ADAL" clId="{DB2ECFE5-EF57-4849-ACE3-92B6D295F1C6}" dt="2025-03-14T09:21:25.937" v="719" actId="1076"/>
         <pc:sldMkLst>
           <pc:docMk/>
           <pc:sldMk cId="3481885486" sldId="575"/>
@@ -511,7 +614,7 @@
           </ac:spMkLst>
         </pc:spChg>
         <pc:spChg chg="add mod">
-          <ac:chgData name="EFINGER, MATHIAS" userId="79c67f0a-8032-477f-8942-8b9587cdf009" providerId="ADAL" clId="{DB2ECFE5-EF57-4849-ACE3-92B6D295F1C6}" dt="2025-03-14T09:15:13.805" v="644" actId="20577"/>
+          <ac:chgData name="EFINGER, MATHIAS" userId="79c67f0a-8032-477f-8942-8b9587cdf009" providerId="ADAL" clId="{DB2ECFE5-EF57-4849-ACE3-92B6D295F1C6}" dt="2025-03-14T09:19:19.082" v="716" actId="20577"/>
           <ac:spMkLst>
             <pc:docMk/>
             <pc:sldMk cId="3481885486" sldId="575"/>
@@ -519,7 +622,7 @@
           </ac:spMkLst>
         </pc:spChg>
         <pc:picChg chg="add mod">
-          <ac:chgData name="EFINGER, MATHIAS" userId="79c67f0a-8032-477f-8942-8b9587cdf009" providerId="ADAL" clId="{DB2ECFE5-EF57-4849-ACE3-92B6D295F1C6}" dt="2025-03-14T09:15:01.863" v="632" actId="1076"/>
+          <ac:chgData name="EFINGER, MATHIAS" userId="79c67f0a-8032-477f-8942-8b9587cdf009" providerId="ADAL" clId="{DB2ECFE5-EF57-4849-ACE3-92B6D295F1C6}" dt="2025-03-14T09:15:59.407" v="652" actId="1076"/>
           <ac:picMkLst>
             <pc:docMk/>
             <pc:sldMk cId="3481885486" sldId="575"/>
@@ -535,7 +638,7 @@
           </ac:picMkLst>
         </pc:picChg>
         <pc:picChg chg="add mod">
-          <ac:chgData name="EFINGER, MATHIAS" userId="79c67f0a-8032-477f-8942-8b9587cdf009" providerId="ADAL" clId="{DB2ECFE5-EF57-4849-ACE3-92B6D295F1C6}" dt="2025-03-14T09:12:51.132" v="588" actId="1076"/>
+          <ac:chgData name="EFINGER, MATHIAS" userId="79c67f0a-8032-477f-8942-8b9587cdf009" providerId="ADAL" clId="{DB2ECFE5-EF57-4849-ACE3-92B6D295F1C6}" dt="2025-03-14T09:16:01.815" v="653" actId="1076"/>
           <ac:picMkLst>
             <pc:docMk/>
             <pc:sldMk cId="3481885486" sldId="575"/>
@@ -559,7 +662,7 @@
           </ac:picMkLst>
         </pc:picChg>
         <pc:picChg chg="add mod">
-          <ac:chgData name="EFINGER, MATHIAS" userId="79c67f0a-8032-477f-8942-8b9587cdf009" providerId="ADAL" clId="{DB2ECFE5-EF57-4849-ACE3-92B6D295F1C6}" dt="2025-03-14T09:15:03.430" v="633" actId="1076"/>
+          <ac:chgData name="EFINGER, MATHIAS" userId="79c67f0a-8032-477f-8942-8b9587cdf009" providerId="ADAL" clId="{DB2ECFE5-EF57-4849-ACE3-92B6D295F1C6}" dt="2025-03-14T09:19:48.659" v="717" actId="1076"/>
           <ac:picMkLst>
             <pc:docMk/>
             <pc:sldMk cId="3481885486" sldId="575"/>
@@ -567,7 +670,7 @@
           </ac:picMkLst>
         </pc:picChg>
         <pc:picChg chg="add mod">
-          <ac:chgData name="EFINGER, MATHIAS" userId="79c67f0a-8032-477f-8942-8b9587cdf009" providerId="ADAL" clId="{DB2ECFE5-EF57-4849-ACE3-92B6D295F1C6}" dt="2025-03-14T09:15:08.175" v="635" actId="1076"/>
+          <ac:chgData name="EFINGER, MATHIAS" userId="79c67f0a-8032-477f-8942-8b9587cdf009" providerId="ADAL" clId="{DB2ECFE5-EF57-4849-ACE3-92B6D295F1C6}" dt="2025-03-14T09:18:53.217" v="690" actId="1076"/>
           <ac:picMkLst>
             <pc:docMk/>
             <pc:sldMk cId="3481885486" sldId="575"/>
@@ -583,7 +686,7 @@
           </ac:picMkLst>
         </pc:picChg>
         <pc:picChg chg="add mod">
-          <ac:chgData name="EFINGER, MATHIAS" userId="79c67f0a-8032-477f-8942-8b9587cdf009" providerId="ADAL" clId="{DB2ECFE5-EF57-4849-ACE3-92B6D295F1C6}" dt="2025-03-14T09:15:09.375" v="636" actId="1076"/>
+          <ac:chgData name="EFINGER, MATHIAS" userId="79c67f0a-8032-477f-8942-8b9587cdf009" providerId="ADAL" clId="{DB2ECFE5-EF57-4849-ACE3-92B6D295F1C6}" dt="2025-03-14T09:21:23.647" v="718" actId="1076"/>
           <ac:picMkLst>
             <pc:docMk/>
             <pc:sldMk cId="3481885486" sldId="575"/>
@@ -591,11 +694,19 @@
           </ac:picMkLst>
         </pc:picChg>
         <pc:picChg chg="add mod">
-          <ac:chgData name="EFINGER, MATHIAS" userId="79c67f0a-8032-477f-8942-8b9587cdf009" providerId="ADAL" clId="{DB2ECFE5-EF57-4849-ACE3-92B6D295F1C6}" dt="2025-03-14T09:15:48.311" v="648" actId="14100"/>
+          <ac:chgData name="EFINGER, MATHIAS" userId="79c67f0a-8032-477f-8942-8b9587cdf009" providerId="ADAL" clId="{DB2ECFE5-EF57-4849-ACE3-92B6D295F1C6}" dt="2025-03-14T09:15:57.679" v="651" actId="1076"/>
           <ac:picMkLst>
             <pc:docMk/>
             <pc:sldMk cId="3481885486" sldId="575"/>
             <ac:picMk id="74" creationId="{ADC0D62D-6BE7-DE2A-0068-616B7822E01A}"/>
+          </ac:picMkLst>
+        </pc:picChg>
+        <pc:picChg chg="add mod">
+          <ac:chgData name="EFINGER, MATHIAS" userId="79c67f0a-8032-477f-8942-8b9587cdf009" providerId="ADAL" clId="{DB2ECFE5-EF57-4849-ACE3-92B6D295F1C6}" dt="2025-03-14T09:21:25.937" v="719" actId="1076"/>
+          <ac:picMkLst>
+            <pc:docMk/>
+            <pc:sldMk cId="3481885486" sldId="575"/>
+            <ac:picMk id="76" creationId="{70430809-DCC6-0721-194C-AE7E876D0742}"/>
           </ac:picMkLst>
         </pc:picChg>
         <pc:cxnChg chg="add del mod">
@@ -6812,7 +6923,14 @@
           <a:bodyPr/>
           <a:lstStyle/>
           <a:p>
-            <a:endParaRPr lang="en-US"/>
+            <a:r>
+              <a:rPr lang="en-US" err="1"/>
+              <a:t>Unterlagen</a:t>
+            </a:r>
+            <a:r>
+              <a:rPr lang="en-US"/>
+              <a:t> ML Tool</a:t>
+            </a:r>
           </a:p>
         </p:txBody>
       </p:sp>
@@ -7282,7 +7400,7 @@
         </p:nvSpPr>
         <p:spPr bwMode="auto">
           <a:xfrm>
-            <a:off x="352425" y="4960535"/>
+            <a:off x="352425" y="5049600"/>
             <a:ext cx="594918" cy="594918"/>
           </a:xfrm>
           <a:custGeom>
@@ -7423,8 +7541,8 @@
         </p:blipFill>
         <p:spPr>
           <a:xfrm>
-            <a:off x="5714722" y="2727034"/>
-            <a:ext cx="5837516" cy="3824579"/>
+            <a:off x="7001214" y="3301007"/>
+            <a:ext cx="4867699" cy="3240710"/>
           </a:xfrm>
           <a:prstGeom prst="rect">
             <a:avLst/>
@@ -7563,8 +7681,8 @@
         </p:nvSpPr>
         <p:spPr bwMode="gray">
           <a:xfrm>
-            <a:off x="1230259" y="1330325"/>
-            <a:ext cx="4543795" cy="830997"/>
+            <a:off x="1142671" y="1330325"/>
+            <a:ext cx="7225638" cy="1206310"/>
           </a:xfrm>
           <a:prstGeom prst="rect">
             <a:avLst/>
@@ -7774,8 +7892,8 @@
         </p:nvSpPr>
         <p:spPr bwMode="gray">
           <a:xfrm>
-            <a:off x="1230259" y="2540395"/>
-            <a:ext cx="4543795" cy="830997"/>
+            <a:off x="1141194" y="2391954"/>
+            <a:ext cx="7492831" cy="890373"/>
           </a:xfrm>
           <a:prstGeom prst="rect">
             <a:avLst/>
@@ -7958,16 +8076,11 @@
               <a:rPr lang="de-DE"/>
             </a:br>
             <a:r>
-              <a:rPr lang="de-DE" b="0"/>
-              <a:t>Alle Unterlagen, die von Bürgerin/Bürgern hochgeladen mit ML gelesen sind und </a:t>
-            </a:r>
-            <a:r>
-              <a:rPr lang="de-DE" b="0" err="1"/>
-              <a:t>basis</a:t>
-            </a:r>
-            <a:r>
-              <a:rPr lang="de-DE" b="0"/>
-              <a:t> für individualisierte Bürgersakte stehen.</a:t>
+              <a:rPr lang="de-DE" sz="1600" b="0">
+                <a:ea typeface="+mn-lt"/>
+                <a:cs typeface="+mn-lt"/>
+              </a:rPr>
+              <a:t>Alle Unterlagen, die von Bürgerinnen und Bürgern hochgeladen werden, werden mithilfe von ML gelesen. Das Ziel ist, das Ausfüllen von Formularen vollständig zu vermeiden, sodass Bürgerinnen und Bürger nur noch mit einer digitalen Signatur unterschreiben müssen.</a:t>
             </a:r>
           </a:p>
         </p:txBody>
@@ -7988,295 +8101,8 @@
         </p:nvSpPr>
         <p:spPr bwMode="gray">
           <a:xfrm>
-            <a:off x="1230259" y="3750465"/>
-            <a:ext cx="4543795" cy="830997"/>
-          </a:xfrm>
-          <a:prstGeom prst="rect">
-            <a:avLst/>
-          </a:prstGeom>
-        </p:spPr>
-        <p:txBody>
-          <a:bodyPr wrap="square" lIns="0" tIns="0" rIns="0" bIns="0">
-            <a:noAutofit/>
-          </a:bodyPr>
-          <a:lstStyle>
-            <a:lvl1pPr marL="0" indent="0" algn="l" defTabSz="914491" rtl="0" eaLnBrk="1" latinLnBrk="0" hangingPunct="1">
-              <a:spcBef>
-                <a:spcPts val="600"/>
-              </a:spcBef>
-              <a:buClr>
-                <a:schemeClr val="accent2"/>
-              </a:buClr>
-              <a:buFont typeface="Wingdings" panose="05000000000000000000" pitchFamily="2" charset="2"/>
-              <a:buNone/>
-              <a:defRPr sz="1800" b="1" i="0" kern="1200">
-                <a:solidFill>
-                  <a:schemeClr val="tx1"/>
-                </a:solidFill>
-                <a:latin typeface="+mn-lt"/>
-                <a:ea typeface="+mn-ea"/>
-                <a:cs typeface="+mn-cs"/>
-              </a:defRPr>
-            </a:lvl1pPr>
-            <a:lvl2pPr marL="180000" indent="-180000" algn="l" defTabSz="914491" rtl="0" eaLnBrk="1" latinLnBrk="0" hangingPunct="1">
-              <a:spcBef>
-                <a:spcPts val="600"/>
-              </a:spcBef>
-              <a:buClr>
-                <a:schemeClr val="accent2"/>
-              </a:buClr>
-              <a:buFont typeface="Wingdings" panose="05000000000000000000" pitchFamily="2" charset="2"/>
-              <a:buChar char="§"/>
-              <a:defRPr sz="1800" i="0" kern="1200">
-                <a:solidFill>
-                  <a:schemeClr val="tx1"/>
-                </a:solidFill>
-                <a:latin typeface="+mn-lt"/>
-                <a:ea typeface="+mn-ea"/>
-                <a:cs typeface="+mn-cs"/>
-              </a:defRPr>
-            </a:lvl2pPr>
-            <a:lvl3pPr marL="180000" indent="-180000" algn="l" defTabSz="914491" rtl="0" eaLnBrk="1" latinLnBrk="0" hangingPunct="1">
-              <a:spcBef>
-                <a:spcPts val="600"/>
-              </a:spcBef>
-              <a:buClr>
-                <a:schemeClr val="accent2"/>
-              </a:buClr>
-              <a:buFont typeface="Wingdings" panose="05000000000000000000" pitchFamily="2" charset="2"/>
-              <a:buChar char="§"/>
-              <a:defRPr sz="1800" b="0" i="0" kern="1200">
-                <a:solidFill>
-                  <a:schemeClr val="tx1"/>
-                </a:solidFill>
-                <a:latin typeface="+mn-lt"/>
-                <a:ea typeface="+mn-ea"/>
-                <a:cs typeface="+mn-cs"/>
-              </a:defRPr>
-            </a:lvl3pPr>
-            <a:lvl4pPr marL="180000" indent="-180000" algn="l" defTabSz="914491" rtl="0" eaLnBrk="1" latinLnBrk="0" hangingPunct="1">
-              <a:spcBef>
-                <a:spcPts val="600"/>
-              </a:spcBef>
-              <a:buClr>
-                <a:schemeClr val="accent2"/>
-              </a:buClr>
-              <a:buFont typeface="Wingdings" panose="05000000000000000000" pitchFamily="2" charset="2"/>
-              <a:buChar char="§"/>
-              <a:defRPr sz="1800" b="0" i="0" kern="1200">
-                <a:solidFill>
-                  <a:schemeClr val="tx1"/>
-                </a:solidFill>
-                <a:latin typeface="+mn-lt"/>
-                <a:ea typeface="+mn-ea"/>
-                <a:cs typeface="+mn-cs"/>
-              </a:defRPr>
-            </a:lvl4pPr>
-            <a:lvl5pPr marL="180000" indent="-180000" algn="l" defTabSz="914491" rtl="0" eaLnBrk="1" latinLnBrk="0" hangingPunct="1">
-              <a:spcBef>
-                <a:spcPts val="600"/>
-              </a:spcBef>
-              <a:buClr>
-                <a:schemeClr val="accent2"/>
-              </a:buClr>
-              <a:buFont typeface="Wingdings" panose="05000000000000000000" pitchFamily="2" charset="2"/>
-              <a:buChar char="§"/>
-              <a:defRPr sz="1800" b="0" i="0" kern="1200">
-                <a:solidFill>
-                  <a:schemeClr val="tx1"/>
-                </a:solidFill>
-                <a:latin typeface="+mn-lt"/>
-                <a:ea typeface="+mn-ea"/>
-                <a:cs typeface="+mn-cs"/>
-              </a:defRPr>
-            </a:lvl5pPr>
-            <a:lvl6pPr marL="543654" indent="-255626" algn="l" defTabSz="914491" rtl="0" eaLnBrk="1" latinLnBrk="0" hangingPunct="1">
-              <a:spcBef>
-                <a:spcPts val="600"/>
-              </a:spcBef>
-              <a:buClr>
-                <a:schemeClr val="accent4"/>
-              </a:buClr>
-              <a:buFont typeface="Wingdings" panose="05000000000000000000" pitchFamily="2" charset="2"/>
-              <a:buChar char="§"/>
-              <a:defRPr sz="1600" kern="1200">
-                <a:solidFill>
-                  <a:schemeClr val="tx1"/>
-                </a:solidFill>
-                <a:latin typeface="+mn-lt"/>
-                <a:ea typeface="+mn-ea"/>
-                <a:cs typeface="+mn-cs"/>
-              </a:defRPr>
-            </a:lvl6pPr>
-            <a:lvl7pPr marL="543654" indent="-255626" algn="l" defTabSz="914491" rtl="0" eaLnBrk="1" latinLnBrk="0" hangingPunct="1">
-              <a:spcBef>
-                <a:spcPts val="600"/>
-              </a:spcBef>
-              <a:buClr>
-                <a:schemeClr val="accent4"/>
-              </a:buClr>
-              <a:buFont typeface="Wingdings" panose="05000000000000000000" pitchFamily="2" charset="2"/>
-              <a:buChar char="§"/>
-              <a:defRPr sz="1600" kern="1200">
-                <a:solidFill>
-                  <a:schemeClr val="tx1"/>
-                </a:solidFill>
-                <a:latin typeface="+mn-lt"/>
-                <a:ea typeface="+mn-ea"/>
-                <a:cs typeface="+mn-cs"/>
-              </a:defRPr>
-            </a:lvl7pPr>
-            <a:lvl8pPr marL="543654" indent="-255626" algn="l" defTabSz="914491" rtl="0" eaLnBrk="1" latinLnBrk="0" hangingPunct="1">
-              <a:spcBef>
-                <a:spcPts val="600"/>
-              </a:spcBef>
-              <a:buClr>
-                <a:schemeClr val="accent4"/>
-              </a:buClr>
-              <a:buFont typeface="Wingdings" panose="05000000000000000000" pitchFamily="2" charset="2"/>
-              <a:buChar char="§"/>
-              <a:defRPr sz="1600" kern="1200">
-                <a:solidFill>
-                  <a:schemeClr val="tx1"/>
-                </a:solidFill>
-                <a:latin typeface="+mn-lt"/>
-                <a:ea typeface="+mn-ea"/>
-                <a:cs typeface="+mn-cs"/>
-              </a:defRPr>
-            </a:lvl8pPr>
-            <a:lvl9pPr marL="543654" indent="-255626" algn="l" defTabSz="914491" rtl="0" eaLnBrk="1" latinLnBrk="0" hangingPunct="1">
-              <a:spcBef>
-                <a:spcPts val="600"/>
-              </a:spcBef>
-              <a:buClr>
-                <a:schemeClr val="accent4"/>
-              </a:buClr>
-              <a:buFont typeface="Wingdings" panose="05000000000000000000" pitchFamily="2" charset="2"/>
-              <a:buChar char="§"/>
-              <a:defRPr sz="1600" kern="1200">
-                <a:solidFill>
-                  <a:schemeClr val="tx1"/>
-                </a:solidFill>
-                <a:latin typeface="+mn-lt"/>
-                <a:ea typeface="+mn-ea"/>
-                <a:cs typeface="+mn-cs"/>
-              </a:defRPr>
-            </a:lvl9pPr>
-          </a:lstStyle>
-          <a:p>
-            <a:r>
-              <a:rPr lang="de-DE" err="1"/>
-              <a:t>Improve</a:t>
-            </a:r>
-            <a:br>
-              <a:rPr lang="de-DE"/>
-            </a:br>
-            <a:r>
-              <a:rPr lang="de-DE" b="0" err="1"/>
-              <a:t>Lorem</a:t>
-            </a:r>
-            <a:r>
-              <a:rPr lang="de-DE" b="0"/>
-              <a:t> </a:t>
-            </a:r>
-            <a:r>
-              <a:rPr lang="de-DE" b="0" err="1"/>
-              <a:t>ipsum</a:t>
-            </a:r>
-            <a:r>
-              <a:rPr lang="de-DE" b="0"/>
-              <a:t> </a:t>
-            </a:r>
-            <a:r>
-              <a:rPr lang="de-DE" b="0" err="1"/>
-              <a:t>dolor</a:t>
-            </a:r>
-            <a:r>
-              <a:rPr lang="de-DE" b="0"/>
-              <a:t> </a:t>
-            </a:r>
-            <a:r>
-              <a:rPr lang="de-DE" b="0" err="1"/>
-              <a:t>sit</a:t>
-            </a:r>
-            <a:r>
-              <a:rPr lang="de-DE" b="0"/>
-              <a:t> </a:t>
-            </a:r>
-            <a:r>
-              <a:rPr lang="de-DE" b="0" err="1"/>
-              <a:t>amet</a:t>
-            </a:r>
-            <a:r>
-              <a:rPr lang="de-DE" b="0"/>
-              <a:t>, </a:t>
-            </a:r>
-            <a:r>
-              <a:rPr lang="de-DE" b="0" err="1"/>
-              <a:t>consetetur</a:t>
-            </a:r>
-            <a:r>
-              <a:rPr lang="de-DE" b="0"/>
-              <a:t> </a:t>
-            </a:r>
-            <a:r>
-              <a:rPr lang="de-DE" b="0" err="1"/>
-              <a:t>sadipscing</a:t>
-            </a:r>
-            <a:r>
-              <a:rPr lang="de-DE" b="0"/>
-              <a:t> </a:t>
-            </a:r>
-            <a:r>
-              <a:rPr lang="de-DE" b="0" err="1"/>
-              <a:t>elitr</a:t>
-            </a:r>
-            <a:r>
-              <a:rPr lang="de-DE" b="0"/>
-              <a:t>, sed </a:t>
-            </a:r>
-            <a:r>
-              <a:rPr lang="de-DE" b="0" err="1"/>
-              <a:t>diam</a:t>
-            </a:r>
-            <a:r>
-              <a:rPr lang="de-DE" b="0"/>
-              <a:t> </a:t>
-            </a:r>
-            <a:r>
-              <a:rPr lang="de-DE" b="0" err="1"/>
-              <a:t>nonumy</a:t>
-            </a:r>
-            <a:r>
-              <a:rPr lang="de-DE" b="0"/>
-              <a:t> </a:t>
-            </a:r>
-            <a:r>
-              <a:rPr lang="de-DE" b="0" err="1"/>
-              <a:t>eirmod</a:t>
-            </a:r>
-            <a:endParaRPr lang="de-DE" b="0"/>
-          </a:p>
-        </p:txBody>
-      </p:sp>
-      <p:sp>
-        <p:nvSpPr>
-          <p:cNvPr id="55" name="Textplatzhalter 9">
-            <a:extLst>
-              <a:ext uri="{FF2B5EF4-FFF2-40B4-BE49-F238E27FC236}">
-                <a16:creationId xmlns:a16="http://schemas.microsoft.com/office/drawing/2014/main" id="{C17709ED-4FA6-A454-97A7-AC3BF5B3C1B0}"/>
-              </a:ext>
-            </a:extLst>
-          </p:cNvPr>
-          <p:cNvSpPr txBox="1">
-            <a:spLocks/>
-          </p:cNvSpPr>
-          <p:nvPr/>
-        </p:nvSpPr>
-        <p:spPr bwMode="gray">
-          <a:xfrm>
-            <a:off x="1230259" y="4960535"/>
-            <a:ext cx="4543795" cy="830997"/>
+            <a:off x="1142671" y="3754306"/>
+            <a:ext cx="7077195" cy="850789"/>
           </a:xfrm>
           <a:prstGeom prst="rect">
             <a:avLst/>
@@ -8453,15 +8279,235 @@
           <a:p>
             <a:r>
               <a:rPr lang="de-DE"/>
-              <a:t>Zentrales Bürgerportal</a:t>
+              <a:t>Termin Vereinbarung</a:t>
             </a:r>
             <a:br>
               <a:rPr lang="de-DE"/>
             </a:br>
             <a:r>
-              <a:rPr lang="de-DE" b="0"/>
-              <a:t>Mit eigener Akte und "Wolfi" als zentraler KI-Unterstützer</a:t>
-            </a:r>
+              <a:rPr lang="de-DE" sz="1600" b="0">
+                <a:ea typeface="+mn-lt"/>
+                <a:cs typeface="+mn-lt"/>
+              </a:rPr>
+              <a:t>Die KI informiert proaktiv darüber, welche Leistungen verfügbar sind, seit wann  und welche Schritte noch ausstehen. Sie bietet nicht nur einen Termin beim Bürgeramt an, sondern erstellt auch eine persönliche Roadmap im eigenen Kalender.</a:t>
+            </a:r>
+            <a:endParaRPr lang="de-DE" sz="1600" b="0"/>
+          </a:p>
+          <a:p>
+            <a:endParaRPr lang="de-DE"/>
+          </a:p>
+        </p:txBody>
+      </p:sp>
+      <p:sp>
+        <p:nvSpPr>
+          <p:cNvPr id="55" name="Textplatzhalter 9">
+            <a:extLst>
+              <a:ext uri="{FF2B5EF4-FFF2-40B4-BE49-F238E27FC236}">
+                <a16:creationId xmlns:a16="http://schemas.microsoft.com/office/drawing/2014/main" id="{C17709ED-4FA6-A454-97A7-AC3BF5B3C1B0}"/>
+              </a:ext>
+            </a:extLst>
+          </p:cNvPr>
+          <p:cNvSpPr txBox="1">
+            <a:spLocks/>
+          </p:cNvSpPr>
+          <p:nvPr/>
+        </p:nvSpPr>
+        <p:spPr bwMode="gray">
+          <a:xfrm>
+            <a:off x="1141194" y="5049600"/>
+            <a:ext cx="5770911" cy="890373"/>
+          </a:xfrm>
+          <a:prstGeom prst="rect">
+            <a:avLst/>
+          </a:prstGeom>
+        </p:spPr>
+        <p:txBody>
+          <a:bodyPr wrap="square" lIns="0" tIns="0" rIns="0" bIns="0" anchor="t">
+            <a:noAutofit/>
+          </a:bodyPr>
+          <a:lstStyle>
+            <a:lvl1pPr marL="0" indent="0" algn="l" defTabSz="914491" rtl="0" eaLnBrk="1" latinLnBrk="0" hangingPunct="1">
+              <a:spcBef>
+                <a:spcPts val="600"/>
+              </a:spcBef>
+              <a:buClr>
+                <a:schemeClr val="accent2"/>
+              </a:buClr>
+              <a:buFont typeface="Wingdings" panose="05000000000000000000" pitchFamily="2" charset="2"/>
+              <a:buNone/>
+              <a:defRPr sz="1800" b="1" i="0" kern="1200">
+                <a:solidFill>
+                  <a:schemeClr val="tx1"/>
+                </a:solidFill>
+                <a:latin typeface="+mn-lt"/>
+                <a:ea typeface="+mn-ea"/>
+                <a:cs typeface="+mn-cs"/>
+              </a:defRPr>
+            </a:lvl1pPr>
+            <a:lvl2pPr marL="180000" indent="-180000" algn="l" defTabSz="914491" rtl="0" eaLnBrk="1" latinLnBrk="0" hangingPunct="1">
+              <a:spcBef>
+                <a:spcPts val="600"/>
+              </a:spcBef>
+              <a:buClr>
+                <a:schemeClr val="accent2"/>
+              </a:buClr>
+              <a:buFont typeface="Wingdings" panose="05000000000000000000" pitchFamily="2" charset="2"/>
+              <a:buChar char="§"/>
+              <a:defRPr sz="1800" i="0" kern="1200">
+                <a:solidFill>
+                  <a:schemeClr val="tx1"/>
+                </a:solidFill>
+                <a:latin typeface="+mn-lt"/>
+                <a:ea typeface="+mn-ea"/>
+                <a:cs typeface="+mn-cs"/>
+              </a:defRPr>
+            </a:lvl2pPr>
+            <a:lvl3pPr marL="180000" indent="-180000" algn="l" defTabSz="914491" rtl="0" eaLnBrk="1" latinLnBrk="0" hangingPunct="1">
+              <a:spcBef>
+                <a:spcPts val="600"/>
+              </a:spcBef>
+              <a:buClr>
+                <a:schemeClr val="accent2"/>
+              </a:buClr>
+              <a:buFont typeface="Wingdings" panose="05000000000000000000" pitchFamily="2" charset="2"/>
+              <a:buChar char="§"/>
+              <a:defRPr sz="1800" b="0" i="0" kern="1200">
+                <a:solidFill>
+                  <a:schemeClr val="tx1"/>
+                </a:solidFill>
+                <a:latin typeface="+mn-lt"/>
+                <a:ea typeface="+mn-ea"/>
+                <a:cs typeface="+mn-cs"/>
+              </a:defRPr>
+            </a:lvl3pPr>
+            <a:lvl4pPr marL="180000" indent="-180000" algn="l" defTabSz="914491" rtl="0" eaLnBrk="1" latinLnBrk="0" hangingPunct="1">
+              <a:spcBef>
+                <a:spcPts val="600"/>
+              </a:spcBef>
+              <a:buClr>
+                <a:schemeClr val="accent2"/>
+              </a:buClr>
+              <a:buFont typeface="Wingdings" panose="05000000000000000000" pitchFamily="2" charset="2"/>
+              <a:buChar char="§"/>
+              <a:defRPr sz="1800" b="0" i="0" kern="1200">
+                <a:solidFill>
+                  <a:schemeClr val="tx1"/>
+                </a:solidFill>
+                <a:latin typeface="+mn-lt"/>
+                <a:ea typeface="+mn-ea"/>
+                <a:cs typeface="+mn-cs"/>
+              </a:defRPr>
+            </a:lvl4pPr>
+            <a:lvl5pPr marL="180000" indent="-180000" algn="l" defTabSz="914491" rtl="0" eaLnBrk="1" latinLnBrk="0" hangingPunct="1">
+              <a:spcBef>
+                <a:spcPts val="600"/>
+              </a:spcBef>
+              <a:buClr>
+                <a:schemeClr val="accent2"/>
+              </a:buClr>
+              <a:buFont typeface="Wingdings" panose="05000000000000000000" pitchFamily="2" charset="2"/>
+              <a:buChar char="§"/>
+              <a:defRPr sz="1800" b="0" i="0" kern="1200">
+                <a:solidFill>
+                  <a:schemeClr val="tx1"/>
+                </a:solidFill>
+                <a:latin typeface="+mn-lt"/>
+                <a:ea typeface="+mn-ea"/>
+                <a:cs typeface="+mn-cs"/>
+              </a:defRPr>
+            </a:lvl5pPr>
+            <a:lvl6pPr marL="543654" indent="-255626" algn="l" defTabSz="914491" rtl="0" eaLnBrk="1" latinLnBrk="0" hangingPunct="1">
+              <a:spcBef>
+                <a:spcPts val="600"/>
+              </a:spcBef>
+              <a:buClr>
+                <a:schemeClr val="accent4"/>
+              </a:buClr>
+              <a:buFont typeface="Wingdings" panose="05000000000000000000" pitchFamily="2" charset="2"/>
+              <a:buChar char="§"/>
+              <a:defRPr sz="1600" kern="1200">
+                <a:solidFill>
+                  <a:schemeClr val="tx1"/>
+                </a:solidFill>
+                <a:latin typeface="+mn-lt"/>
+                <a:ea typeface="+mn-ea"/>
+                <a:cs typeface="+mn-cs"/>
+              </a:defRPr>
+            </a:lvl6pPr>
+            <a:lvl7pPr marL="543654" indent="-255626" algn="l" defTabSz="914491" rtl="0" eaLnBrk="1" latinLnBrk="0" hangingPunct="1">
+              <a:spcBef>
+                <a:spcPts val="600"/>
+              </a:spcBef>
+              <a:buClr>
+                <a:schemeClr val="accent4"/>
+              </a:buClr>
+              <a:buFont typeface="Wingdings" panose="05000000000000000000" pitchFamily="2" charset="2"/>
+              <a:buChar char="§"/>
+              <a:defRPr sz="1600" kern="1200">
+                <a:solidFill>
+                  <a:schemeClr val="tx1"/>
+                </a:solidFill>
+                <a:latin typeface="+mn-lt"/>
+                <a:ea typeface="+mn-ea"/>
+                <a:cs typeface="+mn-cs"/>
+              </a:defRPr>
+            </a:lvl7pPr>
+            <a:lvl8pPr marL="543654" indent="-255626" algn="l" defTabSz="914491" rtl="0" eaLnBrk="1" latinLnBrk="0" hangingPunct="1">
+              <a:spcBef>
+                <a:spcPts val="600"/>
+              </a:spcBef>
+              <a:buClr>
+                <a:schemeClr val="accent4"/>
+              </a:buClr>
+              <a:buFont typeface="Wingdings" panose="05000000000000000000" pitchFamily="2" charset="2"/>
+              <a:buChar char="§"/>
+              <a:defRPr sz="1600" kern="1200">
+                <a:solidFill>
+                  <a:schemeClr val="tx1"/>
+                </a:solidFill>
+                <a:latin typeface="+mn-lt"/>
+                <a:ea typeface="+mn-ea"/>
+                <a:cs typeface="+mn-cs"/>
+              </a:defRPr>
+            </a:lvl8pPr>
+            <a:lvl9pPr marL="543654" indent="-255626" algn="l" defTabSz="914491" rtl="0" eaLnBrk="1" latinLnBrk="0" hangingPunct="1">
+              <a:spcBef>
+                <a:spcPts val="600"/>
+              </a:spcBef>
+              <a:buClr>
+                <a:schemeClr val="accent4"/>
+              </a:buClr>
+              <a:buFont typeface="Wingdings" panose="05000000000000000000" pitchFamily="2" charset="2"/>
+              <a:buChar char="§"/>
+              <a:defRPr sz="1600" kern="1200">
+                <a:solidFill>
+                  <a:schemeClr val="tx1"/>
+                </a:solidFill>
+                <a:latin typeface="+mn-lt"/>
+                <a:ea typeface="+mn-ea"/>
+                <a:cs typeface="+mn-cs"/>
+              </a:defRPr>
+            </a:lvl9pPr>
+          </a:lstStyle>
+          <a:p>
+            <a:r>
+              <a:rPr lang="de-DE"/>
+              <a:t>Zentrales Bürgerportal</a:t>
+            </a:r>
+            <a:br>
+              <a:rPr lang="de-DE"/>
+            </a:br>
+            <a:r>
+              <a:rPr lang="de-DE" sz="1600" b="0">
+                <a:ea typeface="+mn-lt"/>
+                <a:cs typeface="+mn-lt"/>
+              </a:rPr>
+              <a:t>Der Bürger wird individuell über ein persönliches Bürger-Cockpit geführt, wodurch die Anzahl der notwendigen Besuche im Bürgeramt reduziert wird. Dadurch verringert sich auch der Druck auf die Stadtverwaltung, während die Effizienz erheblich steigt.</a:t>
+            </a:r>
+            <a:endParaRPr lang="de-DE" sz="1600"/>
+          </a:p>
+          <a:p>
+            <a:endParaRPr lang="de-DE"/>
           </a:p>
         </p:txBody>
       </p:sp>
@@ -8479,7 +8525,7 @@
         </p:nvGrpSpPr>
         <p:grpSpPr>
           <a:xfrm>
-            <a:off x="9344651" y="2191238"/>
+            <a:off x="9908729" y="2656355"/>
             <a:ext cx="594918" cy="953405"/>
             <a:chOff x="9541501" y="1698355"/>
             <a:chExt cx="594918" cy="953405"/>
@@ -8680,7 +8726,7 @@
         </p:nvGrpSpPr>
         <p:grpSpPr>
           <a:xfrm>
-            <a:off x="7084196" y="2856040"/>
+            <a:off x="9043625" y="2836248"/>
             <a:ext cx="594918" cy="1332543"/>
             <a:chOff x="7281046" y="2363157"/>
             <a:chExt cx="594918" cy="1332543"/>
@@ -9082,7 +9128,7 @@
         </p:nvGrpSpPr>
         <p:grpSpPr>
           <a:xfrm>
-            <a:off x="5785705" y="5232216"/>
+            <a:off x="6913861" y="5054086"/>
             <a:ext cx="594918" cy="1310947"/>
             <a:chOff x="5982555" y="4739333"/>
             <a:chExt cx="594918" cy="1310947"/>
@@ -9283,7 +9329,7 @@
         </p:nvGrpSpPr>
         <p:grpSpPr>
           <a:xfrm>
-            <a:off x="7716857" y="2132678"/>
+            <a:off x="8597610" y="2409769"/>
             <a:ext cx="636487" cy="585245"/>
             <a:chOff x="7913707" y="1639795"/>
             <a:chExt cx="636487" cy="585245"/>
@@ -9728,7 +9774,7 @@
         </p:blipFill>
         <p:spPr>
           <a:xfrm>
-            <a:off x="8845559" y="2286330"/>
+            <a:off x="8805965" y="2385654"/>
             <a:ext cx="1136641" cy="733872"/>
           </a:xfrm>
           <a:prstGeom prst="rect">
@@ -9758,7 +9804,7 @@
         </p:blipFill>
         <p:spPr>
           <a:xfrm>
-            <a:off x="6135656" y="3113357"/>
+            <a:off x="6276899" y="2908736"/>
             <a:ext cx="2017744" cy="536389"/>
           </a:xfrm>
           <a:prstGeom prst="rect">
@@ -9781,7 +9827,7 @@
         <p:spPr>
           <a:xfrm>
             <a:off x="838200" y="2102798"/>
-            <a:ext cx="5996940" cy="3139321"/>
+            <a:ext cx="5996940" cy="3416320"/>
           </a:xfrm>
           <a:prstGeom prst="rect">
             <a:avLst/>
@@ -9840,9 +9886,10 @@
               <a:buChar char="•"/>
             </a:pPr>
             <a:r>
-              <a:rPr lang="en-US"/>
-              <a:t>Llama / Mistral</a:t>
-            </a:r>
+              <a:rPr lang="en-US" err="1"/>
+              <a:t>FastAPI</a:t>
+            </a:r>
+            <a:endParaRPr lang="en-US"/>
           </a:p>
           <a:p>
             <a:pPr marL="285750" indent="-285750">
@@ -9851,9 +9898,19 @@
             </a:pPr>
             <a:r>
               <a:rPr lang="en-US" err="1"/>
-              <a:t>FastAPI</a:t>
+              <a:t>Ollama</a:t>
             </a:r>
             <a:endParaRPr lang="en-US"/>
+          </a:p>
+          <a:p>
+            <a:pPr marL="285750" indent="-285750">
+              <a:buFont typeface="Arial" panose="020B0604020202020204" pitchFamily="34" charset="0"/>
+              <a:buChar char="•"/>
+            </a:pPr>
+            <a:r>
+              <a:rPr lang="en-US"/>
+              <a:t>Mistral Nemo / Llama3</a:t>
+            </a:r>
           </a:p>
           <a:p>
             <a:endParaRPr lang="en-US"/>
@@ -9912,7 +9969,7 @@
         </p:blipFill>
         <p:spPr>
           <a:xfrm>
-            <a:off x="6835140" y="1356224"/>
+            <a:off x="6921361" y="1438406"/>
             <a:ext cx="1516920" cy="1516920"/>
           </a:xfrm>
           <a:prstGeom prst="rect">
@@ -9942,8 +9999,8 @@
         </p:blipFill>
         <p:spPr>
           <a:xfrm>
-            <a:off x="5579048" y="3986724"/>
-            <a:ext cx="2157354" cy="1213511"/>
+            <a:off x="5145763" y="3766931"/>
+            <a:ext cx="1895875" cy="1066429"/>
           </a:xfrm>
           <a:prstGeom prst="rect">
             <a:avLst/>
@@ -10002,7 +10059,7 @@
         </p:blipFill>
         <p:spPr>
           <a:xfrm>
-            <a:off x="7736402" y="4884124"/>
+            <a:off x="8101143" y="4787850"/>
             <a:ext cx="1327796" cy="1327796"/>
           </a:xfrm>
           <a:prstGeom prst="rect">
@@ -10032,8 +10089,38 @@
         </p:blipFill>
         <p:spPr>
           <a:xfrm>
-            <a:off x="5220058" y="3113357"/>
+            <a:off x="9079627" y="1487820"/>
             <a:ext cx="2552341" cy="919726"/>
+          </a:xfrm>
+          <a:prstGeom prst="rect">
+            <a:avLst/>
+          </a:prstGeom>
+        </p:spPr>
+      </p:pic>
+      <p:pic>
+        <p:nvPicPr>
+          <p:cNvPr id="76" name="Picture 75" descr="A black background with a black square&#10;&#10;AI-generated content may be incorrect.">
+            <a:extLst>
+              <a:ext uri="{FF2B5EF4-FFF2-40B4-BE49-F238E27FC236}">
+                <a16:creationId xmlns:a16="http://schemas.microsoft.com/office/drawing/2014/main" id="{70430809-DCC6-0721-194C-AE7E876D0742}"/>
+              </a:ext>
+            </a:extLst>
+          </p:cNvPr>
+          <p:cNvPicPr>
+            <a:picLocks noChangeAspect="1"/>
+          </p:cNvPicPr>
+          <p:nvPr/>
+        </p:nvPicPr>
+        <p:blipFill>
+          <a:blip r:embed="rId9"/>
+          <a:stretch>
+            <a:fillRect/>
+          </a:stretch>
+        </p:blipFill>
+        <p:spPr>
+          <a:xfrm>
+            <a:off x="6777179" y="4324768"/>
+            <a:ext cx="1017183" cy="1017183"/>
           </a:xfrm>
           <a:prstGeom prst="rect">
             <a:avLst/>

</xml_diff>